<commit_message>
commits file name changes and changes to the regression example.
</commit_message>
<xml_diff>
--- a/secondPart/Neural Networks - pt 2.pptx
+++ b/secondPart/Neural Networks - pt 2.pptx
@@ -5,7 +5,7 @@
     <p:sldMasterId id="2147483648" r:id="rId1"/>
   </p:sldMasterIdLst>
   <p:notesMasterIdLst>
-    <p:notesMasterId r:id="rId76"/>
+    <p:notesMasterId r:id="rId77"/>
   </p:notesMasterIdLst>
   <p:sldIdLst>
     <p:sldId id="256" r:id="rId2"/>
@@ -80,8 +80,9 @@
     <p:sldId id="329" r:id="rId71"/>
     <p:sldId id="330" r:id="rId72"/>
     <p:sldId id="331" r:id="rId73"/>
-    <p:sldId id="315" r:id="rId74"/>
-    <p:sldId id="266" r:id="rId75"/>
+    <p:sldId id="357" r:id="rId74"/>
+    <p:sldId id="315" r:id="rId75"/>
+    <p:sldId id="266" r:id="rId76"/>
   </p:sldIdLst>
   <p:sldSz cx="12192000" cy="6858000"/>
   <p:notesSz cx="6858000" cy="9144000"/>
@@ -296,7 +297,7 @@
           <a:p>
             <a:fld id="{766F6706-68D4-43E3-BBB5-61B91BFFF605}" type="datetimeFigureOut">
               <a:rPr lang="en-US" smtClean="0"/>
-              <a:t>10/21/2021</a:t>
+              <a:t>10/22/2021</a:t>
             </a:fld>
             <a:endParaRPr lang="en-US"/>
           </a:p>
@@ -1665,7 +1666,7 @@
           <a:p>
             <a:fld id="{73FE1430-CE5A-4672-87A4-A80896D430D3}" type="datetimeFigureOut">
               <a:rPr lang="en-US" smtClean="0"/>
-              <a:t>10/21/2021</a:t>
+              <a:t>10/22/2021</a:t>
             </a:fld>
             <a:endParaRPr lang="en-US"/>
           </a:p>
@@ -1833,7 +1834,7 @@
           <a:p>
             <a:fld id="{73FE1430-CE5A-4672-87A4-A80896D430D3}" type="datetimeFigureOut">
               <a:rPr lang="en-US" smtClean="0"/>
-              <a:t>10/21/2021</a:t>
+              <a:t>10/22/2021</a:t>
             </a:fld>
             <a:endParaRPr lang="en-US"/>
           </a:p>
@@ -2011,7 +2012,7 @@
           <a:p>
             <a:fld id="{73FE1430-CE5A-4672-87A4-A80896D430D3}" type="datetimeFigureOut">
               <a:rPr lang="en-US" smtClean="0"/>
-              <a:t>10/21/2021</a:t>
+              <a:t>10/22/2021</a:t>
             </a:fld>
             <a:endParaRPr lang="en-US"/>
           </a:p>
@@ -2179,7 +2180,7 @@
           <a:p>
             <a:fld id="{73FE1430-CE5A-4672-87A4-A80896D430D3}" type="datetimeFigureOut">
               <a:rPr lang="en-US" smtClean="0"/>
-              <a:t>10/21/2021</a:t>
+              <a:t>10/22/2021</a:t>
             </a:fld>
             <a:endParaRPr lang="en-US"/>
           </a:p>
@@ -2424,7 +2425,7 @@
           <a:p>
             <a:fld id="{73FE1430-CE5A-4672-87A4-A80896D430D3}" type="datetimeFigureOut">
               <a:rPr lang="en-US" smtClean="0"/>
-              <a:t>10/21/2021</a:t>
+              <a:t>10/22/2021</a:t>
             </a:fld>
             <a:endParaRPr lang="en-US"/>
           </a:p>
@@ -2653,7 +2654,7 @@
           <a:p>
             <a:fld id="{73FE1430-CE5A-4672-87A4-A80896D430D3}" type="datetimeFigureOut">
               <a:rPr lang="en-US" smtClean="0"/>
-              <a:t>10/21/2021</a:t>
+              <a:t>10/22/2021</a:t>
             </a:fld>
             <a:endParaRPr lang="en-US"/>
           </a:p>
@@ -3017,7 +3018,7 @@
           <a:p>
             <a:fld id="{73FE1430-CE5A-4672-87A4-A80896D430D3}" type="datetimeFigureOut">
               <a:rPr lang="en-US" smtClean="0"/>
-              <a:t>10/21/2021</a:t>
+              <a:t>10/22/2021</a:t>
             </a:fld>
             <a:endParaRPr lang="en-US"/>
           </a:p>
@@ -3134,7 +3135,7 @@
           <a:p>
             <a:fld id="{73FE1430-CE5A-4672-87A4-A80896D430D3}" type="datetimeFigureOut">
               <a:rPr lang="en-US" smtClean="0"/>
-              <a:t>10/21/2021</a:t>
+              <a:t>10/22/2021</a:t>
             </a:fld>
             <a:endParaRPr lang="en-US"/>
           </a:p>
@@ -3229,7 +3230,7 @@
           <a:p>
             <a:fld id="{73FE1430-CE5A-4672-87A4-A80896D430D3}" type="datetimeFigureOut">
               <a:rPr lang="en-US" smtClean="0"/>
-              <a:t>10/21/2021</a:t>
+              <a:t>10/22/2021</a:t>
             </a:fld>
             <a:endParaRPr lang="en-US"/>
           </a:p>
@@ -3504,7 +3505,7 @@
           <a:p>
             <a:fld id="{73FE1430-CE5A-4672-87A4-A80896D430D3}" type="datetimeFigureOut">
               <a:rPr lang="en-US" smtClean="0"/>
-              <a:t>10/21/2021</a:t>
+              <a:t>10/22/2021</a:t>
             </a:fld>
             <a:endParaRPr lang="en-US"/>
           </a:p>
@@ -3756,7 +3757,7 @@
           <a:p>
             <a:fld id="{73FE1430-CE5A-4672-87A4-A80896D430D3}" type="datetimeFigureOut">
               <a:rPr lang="en-US" smtClean="0"/>
-              <a:t>10/21/2021</a:t>
+              <a:t>10/22/2021</a:t>
             </a:fld>
             <a:endParaRPr lang="en-US"/>
           </a:p>
@@ -3967,7 +3968,7 @@
           <a:p>
             <a:fld id="{73FE1430-CE5A-4672-87A4-A80896D430D3}" type="datetimeFigureOut">
               <a:rPr lang="en-US" smtClean="0"/>
-              <a:t>10/21/2021</a:t>
+              <a:t>10/22/2021</a:t>
             </a:fld>
             <a:endParaRPr lang="en-US"/>
           </a:p>
@@ -4529,7 +4530,7 @@
                 </a:r>
                 <a:r>
                   <a:rPr lang="en-US" sz="2400" dirty="0"/>
-                  <a:t> after in gradient descent are the gradients of the Loss function, relative to the parameters, </a:t>
+                  <a:t> after in gradient descent are the gradients of the Loss function with respect to the parameters, </a:t>
                 </a:r>
                 <a14:m>
                   <m:oMath xmlns:m="http://schemas.openxmlformats.org/officeDocument/2006/math">
@@ -4796,7 +4797,7 @@
               <a:blipFill>
                 <a:blip r:embed="rId2"/>
                 <a:stretch>
-                  <a:fillRect l="-928" t="-9459" r="-116" b="-133108"/>
+                  <a:fillRect l="-928" t="-9459" b="-133108"/>
                 </a:stretch>
               </a:blipFill>
             </p:spPr>
@@ -4824,7 +4825,7 @@
         <p:spPr>
           <a:xfrm>
             <a:off x="1146629" y="4325257"/>
-            <a:ext cx="9681028" cy="830997"/>
+            <a:ext cx="9681028" cy="1200329"/>
           </a:xfrm>
           <a:prstGeom prst="rect">
             <a:avLst/>
@@ -4839,7 +4840,15 @@
           <a:p>
             <a:r>
               <a:rPr lang="en-US" sz="2400" dirty="0"/>
-              <a:t>We could easily plug and do calculus. Instead, let’s take a different tack.</a:t>
+              <a:t>We could easily plug and perform symbolic calculus. Instead, we’ll take a different tack and </a:t>
+            </a:r>
+            <a:r>
+              <a:rPr lang="en-US" sz="2400" b="1" dirty="0"/>
+              <a:t>solve empirically</a:t>
+            </a:r>
+            <a:r>
+              <a:rPr lang="en-US" sz="2400" dirty="0"/>
+              <a:t>.</a:t>
             </a:r>
           </a:p>
           <a:p>
@@ -5496,7 +5505,7 @@
                 </a:pPr>
                 <a:r>
                   <a:rPr lang="en-US" dirty="0"/>
-                  <a:t>Even more, helpful, we can look at </a:t>
+                  <a:t>Furthermore, let’s name the intermediate values using “a[0-9]”.</a:t>
                 </a:r>
               </a:p>
               <a:p>
@@ -5555,8 +5564,8 @@
           </p:sp>
         </mc:Fallback>
       </mc:AlternateContent>
-      <mc:AlternateContent xmlns:mc="http://schemas.openxmlformats.org/markup-compatibility/2006">
-        <mc:Choice xmlns:a14="http://schemas.microsoft.com/office/drawing/2010/main" Requires="a14">
+      <mc:AlternateContent xmlns:mc="http://schemas.openxmlformats.org/markup-compatibility/2006" xmlns:a14="http://schemas.microsoft.com/office/drawing/2010/main">
+        <mc:Choice Requires="a14">
           <p:sp>
             <p:nvSpPr>
               <p:cNvPr id="4" name="TextBox 3">
@@ -5725,7 +5734,7 @@
             </p:txBody>
           </p:sp>
         </mc:Choice>
-        <mc:Fallback>
+        <mc:Fallback xmlns="">
           <p:sp>
             <p:nvSpPr>
               <p:cNvPr id="4" name="TextBox 3">
@@ -5940,6 +5949,41 @@
           </a:prstGeom>
         </p:spPr>
       </p:pic>
+      <p:sp>
+        <p:nvSpPr>
+          <p:cNvPr id="3" name="TextBox 2">
+            <a:extLst>
+              <a:ext uri="{FF2B5EF4-FFF2-40B4-BE49-F238E27FC236}">
+                <a16:creationId xmlns:a16="http://schemas.microsoft.com/office/drawing/2014/main" id="{0138802D-E393-4E81-BC2E-8292A43F021B}"/>
+              </a:ext>
+            </a:extLst>
+          </p:cNvPr>
+          <p:cNvSpPr txBox="1"/>
+          <p:nvPr/>
+        </p:nvSpPr>
+        <p:spPr>
+          <a:xfrm>
+            <a:off x="4413504" y="4791456"/>
+            <a:ext cx="1219200" cy="369332"/>
+          </a:xfrm>
+          <a:prstGeom prst="rect">
+            <a:avLst/>
+          </a:prstGeom>
+          <a:noFill/>
+        </p:spPr>
+        <p:txBody>
+          <a:bodyPr wrap="square" rtlCol="0">
+            <a:spAutoFit/>
+          </a:bodyPr>
+          <a:lstStyle/>
+          <a:p>
+            <a:r>
+              <a:rPr lang="en-US" dirty="0"/>
+              <a:t>g(a0,W) </a:t>
+            </a:r>
+          </a:p>
+        </p:txBody>
+      </p:sp>
     </p:spTree>
     <p:extLst>
       <p:ext uri="{BB962C8B-B14F-4D97-AF65-F5344CB8AC3E}">
@@ -6110,6 +6154,41 @@
           </a:prstGeom>
         </p:spPr>
       </p:pic>
+      <p:sp>
+        <p:nvSpPr>
+          <p:cNvPr id="3" name="TextBox 2">
+            <a:extLst>
+              <a:ext uri="{FF2B5EF4-FFF2-40B4-BE49-F238E27FC236}">
+                <a16:creationId xmlns:a16="http://schemas.microsoft.com/office/drawing/2014/main" id="{235A6B38-42ED-42F2-BDE7-B51A93F9C9A7}"/>
+              </a:ext>
+            </a:extLst>
+          </p:cNvPr>
+          <p:cNvSpPr txBox="1"/>
+          <p:nvPr/>
+        </p:nvSpPr>
+        <p:spPr>
+          <a:xfrm>
+            <a:off x="6888480" y="4949952"/>
+            <a:ext cx="1011936" cy="369332"/>
+          </a:xfrm>
+          <a:prstGeom prst="rect">
+            <a:avLst/>
+          </a:prstGeom>
+          <a:noFill/>
+        </p:spPr>
+        <p:txBody>
+          <a:bodyPr wrap="square" rtlCol="0">
+            <a:spAutoFit/>
+          </a:bodyPr>
+          <a:lstStyle/>
+          <a:p>
+            <a:r>
+              <a:rPr lang="en-US" dirty="0"/>
+              <a:t>f(a1,B)</a:t>
+            </a:r>
+          </a:p>
+        </p:txBody>
+      </p:sp>
     </p:spTree>
     <p:extLst>
       <p:ext uri="{BB962C8B-B14F-4D97-AF65-F5344CB8AC3E}">
@@ -8792,8 +8871,8 @@
           <a:chExt cx="0" cy="0"/>
         </a:xfrm>
       </p:grpSpPr>
-      <mc:AlternateContent xmlns:mc="http://schemas.openxmlformats.org/markup-compatibility/2006" xmlns:a14="http://schemas.microsoft.com/office/drawing/2010/main">
-        <mc:Choice Requires="a14">
+      <mc:AlternateContent xmlns:mc="http://schemas.openxmlformats.org/markup-compatibility/2006">
+        <mc:Choice xmlns:a14="http://schemas.microsoft.com/office/drawing/2010/main" Requires="a14">
           <p:sp>
             <p:nvSpPr>
               <p:cNvPr id="3" name="Content Placeholder 2"/>
@@ -8977,7 +9056,7 @@
                 </a:pPr>
                 <a:r>
                   <a:rPr lang="en-US" dirty="0"/>
-                  <a:t>This is real busy.  We’re not going to actually use this.  </a:t>
+                  <a:t>This is really busy.  We’re not going to actually use this.  </a:t>
                 </a:r>
               </a:p>
               <a:p>
@@ -9039,7 +9118,7 @@
             </p:txBody>
           </p:sp>
         </mc:Choice>
-        <mc:Fallback xmlns="">
+        <mc:Fallback>
           <p:sp>
             <p:nvSpPr>
               <p:cNvPr id="3" name="Content Placeholder 2"/>
@@ -12927,8 +13006,8 @@
           </a:p>
         </p:txBody>
       </p:sp>
-      <mc:AlternateContent xmlns:mc="http://schemas.openxmlformats.org/markup-compatibility/2006" xmlns:a14="http://schemas.microsoft.com/office/drawing/2010/main">
-        <mc:Choice Requires="a14">
+      <mc:AlternateContent xmlns:mc="http://schemas.openxmlformats.org/markup-compatibility/2006">
+        <mc:Choice xmlns:a14="http://schemas.microsoft.com/office/drawing/2010/main" Requires="a14">
           <p:sp>
             <p:nvSpPr>
               <p:cNvPr id="6" name="TextBox 5"/>
@@ -12937,7 +13016,7 @@
             </p:nvSpPr>
             <p:spPr>
               <a:xfrm>
-                <a:off x="1712686" y="5167086"/>
+                <a:off x="1712686" y="5044897"/>
                 <a:ext cx="9231085" cy="499560"/>
               </a:xfrm>
               <a:prstGeom prst="rect">
@@ -13064,7 +13143,7 @@
             </p:txBody>
           </p:sp>
         </mc:Choice>
-        <mc:Fallback xmlns="">
+        <mc:Fallback>
           <p:sp>
             <p:nvSpPr>
               <p:cNvPr id="6" name="TextBox 5"/>
@@ -13075,13 +13154,13 @@
             </p:nvSpPr>
             <p:spPr>
               <a:xfrm>
-                <a:off x="1712686" y="5167086"/>
+                <a:off x="1712686" y="5044897"/>
                 <a:ext cx="9231085" cy="499560"/>
               </a:xfrm>
               <a:prstGeom prst="rect">
                 <a:avLst/>
               </a:prstGeom>
-              <a:blipFill rotWithShape="0">
+              <a:blipFill>
                 <a:blip r:embed="rId4"/>
                 <a:stretch>
                   <a:fillRect l="-594" b="-7317"/>
@@ -14090,6 +14169,47 @@
           </p:sp>
         </mc:Fallback>
       </mc:AlternateContent>
+      <p:sp>
+        <p:nvSpPr>
+          <p:cNvPr id="7" name="TextBox 6">
+            <a:extLst>
+              <a:ext uri="{FF2B5EF4-FFF2-40B4-BE49-F238E27FC236}">
+                <a16:creationId xmlns:a16="http://schemas.microsoft.com/office/drawing/2014/main" id="{AE45B483-706B-4C6E-82BB-B89605C2901D}"/>
+              </a:ext>
+            </a:extLst>
+          </p:cNvPr>
+          <p:cNvSpPr txBox="1"/>
+          <p:nvPr/>
+        </p:nvSpPr>
+        <p:spPr>
+          <a:xfrm>
+            <a:off x="6742176" y="4632960"/>
+            <a:ext cx="1426464" cy="646331"/>
+          </a:xfrm>
+          <a:prstGeom prst="rect">
+            <a:avLst/>
+          </a:prstGeom>
+          <a:noFill/>
+        </p:spPr>
+        <p:txBody>
+          <a:bodyPr wrap="square" rtlCol="0">
+            <a:spAutoFit/>
+          </a:bodyPr>
+          <a:lstStyle/>
+          <a:p>
+            <a:r>
+              <a:rPr lang="en-US" dirty="0"/>
+              <a:t>f(x, c) = x + c</a:t>
+            </a:r>
+          </a:p>
+          <a:p>
+            <a:r>
+              <a:rPr lang="en-US" dirty="0"/>
+              <a:t>f(a1,B)</a:t>
+            </a:r>
+          </a:p>
+        </p:txBody>
+      </p:sp>
     </p:spTree>
     <p:extLst>
       <p:ext uri="{BB962C8B-B14F-4D97-AF65-F5344CB8AC3E}">
@@ -14120,8 +14240,8 @@
           <a:chExt cx="0" cy="0"/>
         </a:xfrm>
       </p:grpSpPr>
-      <mc:AlternateContent xmlns:mc="http://schemas.openxmlformats.org/markup-compatibility/2006">
-        <mc:Choice xmlns:a14="http://schemas.microsoft.com/office/drawing/2010/main" Requires="a14">
+      <mc:AlternateContent xmlns:mc="http://schemas.openxmlformats.org/markup-compatibility/2006" xmlns:a14="http://schemas.microsoft.com/office/drawing/2010/main">
+        <mc:Choice Requires="a14">
           <p:sp>
             <p:nvSpPr>
               <p:cNvPr id="3" name="Content Placeholder 2"/>
@@ -14723,7 +14843,7 @@
             </p:txBody>
           </p:sp>
         </mc:Choice>
-        <mc:Fallback>
+        <mc:Fallback xmlns="">
           <p:sp>
             <p:nvSpPr>
               <p:cNvPr id="3" name="Content Placeholder 2"/>
@@ -15726,6 +15846,41 @@
           </a:xfrm>
         </p:spPr>
       </p:pic>
+      <p:sp>
+        <p:nvSpPr>
+          <p:cNvPr id="7" name="TextBox 6">
+            <a:extLst>
+              <a:ext uri="{FF2B5EF4-FFF2-40B4-BE49-F238E27FC236}">
+                <a16:creationId xmlns:a16="http://schemas.microsoft.com/office/drawing/2014/main" id="{5AAB0F4B-B2B0-4311-AFA2-65D1925B5224}"/>
+              </a:ext>
+            </a:extLst>
+          </p:cNvPr>
+          <p:cNvSpPr txBox="1"/>
+          <p:nvPr/>
+        </p:nvSpPr>
+        <p:spPr>
+          <a:xfrm>
+            <a:off x="6742176" y="4632960"/>
+            <a:ext cx="1426464" cy="646331"/>
+          </a:xfrm>
+          <a:prstGeom prst="rect">
+            <a:avLst/>
+          </a:prstGeom>
+          <a:noFill/>
+        </p:spPr>
+        <p:txBody>
+          <a:bodyPr wrap="square" rtlCol="0">
+            <a:spAutoFit/>
+          </a:bodyPr>
+          <a:lstStyle/>
+          <a:p>
+            <a:r>
+              <a:rPr lang="en-US" dirty="0"/>
+              <a:t>a2 = f(a1, b) = a1 + c</a:t>
+            </a:r>
+          </a:p>
+        </p:txBody>
+      </p:sp>
     </p:spTree>
     <p:extLst>
       <p:ext uri="{BB962C8B-B14F-4D97-AF65-F5344CB8AC3E}">
@@ -19205,12 +19360,6 @@
             </a:r>
           </a:p>
           <a:p>
-            <a:r>
-              <a:rPr lang="en-US" dirty="0"/>
-              <a:t>Linear regression</a:t>
-            </a:r>
-          </a:p>
-          <a:p>
             <a:pPr lvl="1"/>
             <a:r>
               <a:rPr lang="en-US" dirty="0"/>
@@ -19218,10 +19367,9 @@
             </a:r>
           </a:p>
           <a:p>
-            <a:pPr lvl="1"/>
             <a:r>
               <a:rPr lang="en-US" dirty="0"/>
-              <a:t>Quick example</a:t>
+              <a:t>Linear regression</a:t>
             </a:r>
           </a:p>
           <a:p>
@@ -19232,9 +19380,16 @@
             </a:r>
           </a:p>
           <a:p>
+            <a:pPr lvl="1"/>
             <a:r>
               <a:rPr lang="en-US" dirty="0"/>
-              <a:t>Neural</a:t>
+              <a:t>Quick high-level, zoomed out example</a:t>
+            </a:r>
+          </a:p>
+          <a:p>
+            <a:r>
+              <a:rPr lang="en-US" dirty="0"/>
+              <a:t>Neural Network</a:t>
             </a:r>
           </a:p>
           <a:p>
@@ -24019,16 +24174,7 @@
             </a:pPr>
             <a:r>
               <a:rPr lang="en-US" dirty="0"/>
-              <a:t>What was the ultimate goal for regression again?  </a:t>
-            </a:r>
-          </a:p>
-          <a:p>
-            <a:pPr marL="0" indent="0">
-              <a:buNone/>
-            </a:pPr>
-            <a:r>
-              <a:rPr lang="en-US" dirty="0"/>
-              <a:t>What are we looking for?</a:t>
+              <a:t>What was the ultimate goal for regression again?  What are we looking for?</a:t>
             </a:r>
           </a:p>
         </p:txBody>
@@ -24199,8 +24345,8 @@
           </p:sp>
         </mc:Fallback>
       </mc:AlternateContent>
-      <mc:AlternateContent xmlns:mc="http://schemas.openxmlformats.org/markup-compatibility/2006">
-        <mc:Choice xmlns:a14="http://schemas.microsoft.com/office/drawing/2010/main" Requires="a14">
+      <mc:AlternateContent xmlns:mc="http://schemas.openxmlformats.org/markup-compatibility/2006" xmlns:a14="http://schemas.microsoft.com/office/drawing/2010/main">
+        <mc:Choice Requires="a14">
           <p:sp>
             <p:nvSpPr>
               <p:cNvPr id="2" name="Content Placeholder 1"/>
@@ -24322,7 +24468,7 @@
             </p:txBody>
           </p:sp>
         </mc:Choice>
-        <mc:Fallback>
+        <mc:Fallback xmlns="">
           <p:sp>
             <p:nvSpPr>
               <p:cNvPr id="2" name="Content Placeholder 1"/>
@@ -24408,8 +24554,8 @@
           </a:p>
         </p:txBody>
       </p:sp>
-      <mc:AlternateContent xmlns:mc="http://schemas.openxmlformats.org/markup-compatibility/2006">
-        <mc:Choice xmlns:a14="http://schemas.microsoft.com/office/drawing/2010/main" Requires="a14">
+      <mc:AlternateContent xmlns:mc="http://schemas.openxmlformats.org/markup-compatibility/2006" xmlns:a14="http://schemas.microsoft.com/office/drawing/2010/main">
+        <mc:Choice Requires="a14">
           <p:sp>
             <p:nvSpPr>
               <p:cNvPr id="3" name="Content Placeholder 2"/>
@@ -24601,7 +24747,7 @@
             </p:txBody>
           </p:sp>
         </mc:Choice>
-        <mc:Fallback>
+        <mc:Fallback xmlns="">
           <p:sp>
             <p:nvSpPr>
               <p:cNvPr id="3" name="Content Placeholder 2"/>
@@ -25195,7 +25341,7 @@
           <a:p>
             <a:r>
               <a:rPr lang="en-US" dirty="0"/>
-              <a:t>Linear regression example; Updating parameter values--Intuition:</a:t>
+              <a:t>Linear regression example; Updating parameter values—What’s the intuition:</a:t>
             </a:r>
           </a:p>
         </p:txBody>
@@ -25585,7 +25731,7 @@
           <a:p>
             <a:r>
               <a:rPr lang="en-US" dirty="0"/>
-              <a:t>What direction do we want this particular y-hat to go to minimize the loss for this observation?</a:t>
+              <a:t>What direction do we want this particular   y-hat to go to minimize the loss for this observation?</a:t>
             </a:r>
           </a:p>
           <a:p>
@@ -26961,16 +27107,25 @@
             <a:pPr marL="0" indent="0">
               <a:buNone/>
             </a:pPr>
-            <a:endParaRPr lang="en-US" dirty="0"/>
+            <a:r>
+              <a:rPr lang="en-US" dirty="0"/>
+              <a:t>What does this look like in practice? </a:t>
+            </a:r>
+          </a:p>
+          <a:p>
+            <a:pPr marL="457200" lvl="1" indent="0">
+              <a:buNone/>
+            </a:pPr>
+            <a:r>
+              <a:rPr lang="en-US" b="1" i="1" dirty="0"/>
+              <a:t>(switch to r)</a:t>
+            </a:r>
           </a:p>
           <a:p>
             <a:pPr marL="0" indent="0">
               <a:buNone/>
             </a:pPr>
-            <a:r>
-              <a:rPr lang="en-US" dirty="0"/>
-              <a:t>What does this look like in practice?  (switch to R (if there’s time))</a:t>
-            </a:r>
+            <a:endParaRPr lang="en-US" dirty="0"/>
           </a:p>
         </p:txBody>
       </p:sp>
@@ -27179,6 +27334,45 @@
           </a:prstGeom>
         </p:spPr>
       </p:pic>
+      <p:sp>
+        <p:nvSpPr>
+          <p:cNvPr id="4" name="TextBox 3">
+            <a:extLst>
+              <a:ext uri="{FF2B5EF4-FFF2-40B4-BE49-F238E27FC236}">
+                <a16:creationId xmlns:a16="http://schemas.microsoft.com/office/drawing/2014/main" id="{1562C506-AD20-4418-994B-826DEF0E9A08}"/>
+              </a:ext>
+            </a:extLst>
+          </p:cNvPr>
+          <p:cNvSpPr txBox="1"/>
+          <p:nvPr/>
+        </p:nvSpPr>
+        <p:spPr>
+          <a:xfrm>
+            <a:off x="1109472" y="2353056"/>
+            <a:ext cx="1109472" cy="461665"/>
+          </a:xfrm>
+          <a:prstGeom prst="rect">
+            <a:avLst/>
+          </a:prstGeom>
+          <a:noFill/>
+        </p:spPr>
+        <p:txBody>
+          <a:bodyPr wrap="square" rtlCol="0">
+            <a:spAutoFit/>
+          </a:bodyPr>
+          <a:lstStyle/>
+          <a:p>
+            <a:r>
+              <a:rPr lang="en-US" sz="1200" dirty="0">
+                <a:solidFill>
+                  <a:srgbClr val="FF0000"/>
+                </a:solidFill>
+              </a:rPr>
+              <a:t>Activations in red</a:t>
+            </a:r>
+          </a:p>
+        </p:txBody>
+      </p:sp>
     </p:spTree>
     <p:extLst>
       <p:ext uri="{BB962C8B-B14F-4D97-AF65-F5344CB8AC3E}">
@@ -27380,8 +27574,8 @@
           </a:p>
         </p:txBody>
       </p:sp>
-      <mc:AlternateContent xmlns:mc="http://schemas.openxmlformats.org/markup-compatibility/2006">
-        <mc:Choice xmlns:a14="http://schemas.microsoft.com/office/drawing/2010/main" Requires="a14">
+      <mc:AlternateContent xmlns:mc="http://schemas.openxmlformats.org/markup-compatibility/2006" xmlns:a14="http://schemas.microsoft.com/office/drawing/2010/main">
+        <mc:Choice Requires="a14">
           <p:sp>
             <p:nvSpPr>
               <p:cNvPr id="7" name="TextBox 6">
@@ -27479,7 +27673,7 @@
             </p:txBody>
           </p:sp>
         </mc:Choice>
-        <mc:Fallback>
+        <mc:Fallback xmlns="">
           <p:sp>
             <p:nvSpPr>
               <p:cNvPr id="7" name="TextBox 6">
@@ -27559,8 +27753,8 @@
           </a:p>
         </p:txBody>
       </p:sp>
-      <mc:AlternateContent xmlns:mc="http://schemas.openxmlformats.org/markup-compatibility/2006">
-        <mc:Choice xmlns:a14="http://schemas.microsoft.com/office/drawing/2010/main" Requires="a14">
+      <mc:AlternateContent xmlns:mc="http://schemas.openxmlformats.org/markup-compatibility/2006" xmlns:a14="http://schemas.microsoft.com/office/drawing/2010/main">
+        <mc:Choice Requires="a14">
           <p:sp>
             <p:nvSpPr>
               <p:cNvPr id="9" name="TextBox 8">
@@ -27798,7 +27992,7 @@
             </p:txBody>
           </p:sp>
         </mc:Choice>
-        <mc:Fallback>
+        <mc:Fallback xmlns="">
           <p:sp>
             <p:nvSpPr>
               <p:cNvPr id="9" name="TextBox 8">
@@ -27860,7 +28054,7 @@
             <p:spPr>
               <a:xfrm>
                 <a:off x="1030513" y="4291876"/>
-                <a:ext cx="10130971" cy="1846659"/>
+                <a:ext cx="10130971" cy="1569660"/>
               </a:xfrm>
               <a:prstGeom prst="rect">
                 <a:avLst/>
@@ -27930,12 +28124,6 @@
               <a:p>
                 <a:endParaRPr lang="en-US" sz="2400" dirty="0"/>
               </a:p>
-              <a:p>
-                <a:r>
-                  <a:rPr lang="en-US" dirty="0"/>
-                  <a:t>(switch to r)</a:t>
-                </a:r>
-              </a:p>
             </p:txBody>
           </p:sp>
         </mc:Choice>
@@ -27957,7 +28145,7 @@
             <p:spPr>
               <a:xfrm>
                 <a:off x="1030513" y="4291876"/>
-                <a:ext cx="10130971" cy="1846659"/>
+                <a:ext cx="10130971" cy="1569660"/>
               </a:xfrm>
               <a:prstGeom prst="rect">
                 <a:avLst/>
@@ -27965,7 +28153,7 @@
               <a:blipFill>
                 <a:blip r:embed="rId5"/>
                 <a:stretch>
-                  <a:fillRect l="-903" t="-2640" b="-4290"/>
+                  <a:fillRect l="-903" t="-3101"/>
                 </a:stretch>
               </a:blipFill>
             </p:spPr>
@@ -28137,6 +28325,45 @@
           </a:p>
         </p:txBody>
       </p:sp>
+      <p:sp>
+        <p:nvSpPr>
+          <p:cNvPr id="6" name="TextBox 5">
+            <a:extLst>
+              <a:ext uri="{FF2B5EF4-FFF2-40B4-BE49-F238E27FC236}">
+                <a16:creationId xmlns:a16="http://schemas.microsoft.com/office/drawing/2014/main" id="{6F32578A-09CC-4352-8D41-BDAEC3CEFCF4}"/>
+              </a:ext>
+            </a:extLst>
+          </p:cNvPr>
+          <p:cNvSpPr txBox="1"/>
+          <p:nvPr/>
+        </p:nvSpPr>
+        <p:spPr>
+          <a:xfrm>
+            <a:off x="1109472" y="2353056"/>
+            <a:ext cx="1109472" cy="461665"/>
+          </a:xfrm>
+          <a:prstGeom prst="rect">
+            <a:avLst/>
+          </a:prstGeom>
+          <a:noFill/>
+        </p:spPr>
+        <p:txBody>
+          <a:bodyPr wrap="square" rtlCol="0">
+            <a:spAutoFit/>
+          </a:bodyPr>
+          <a:lstStyle/>
+          <a:p>
+            <a:r>
+              <a:rPr lang="en-US" sz="1200" dirty="0">
+                <a:solidFill>
+                  <a:srgbClr val="FF0000"/>
+                </a:solidFill>
+              </a:rPr>
+              <a:t>Activations in red</a:t>
+            </a:r>
+          </a:p>
+        </p:txBody>
+      </p:sp>
     </p:spTree>
     <p:extLst>
       <p:ext uri="{BB962C8B-B14F-4D97-AF65-F5344CB8AC3E}">
@@ -28748,6 +28975,45 @@
           </a:prstGeom>
         </p:spPr>
       </p:pic>
+      <p:sp>
+        <p:nvSpPr>
+          <p:cNvPr id="6" name="TextBox 5">
+            <a:extLst>
+              <a:ext uri="{FF2B5EF4-FFF2-40B4-BE49-F238E27FC236}">
+                <a16:creationId xmlns:a16="http://schemas.microsoft.com/office/drawing/2014/main" id="{C5133176-F0B5-4F23-8CF9-390735500474}"/>
+              </a:ext>
+            </a:extLst>
+          </p:cNvPr>
+          <p:cNvSpPr txBox="1"/>
+          <p:nvPr/>
+        </p:nvSpPr>
+        <p:spPr>
+          <a:xfrm>
+            <a:off x="1109472" y="2353056"/>
+            <a:ext cx="1109472" cy="461665"/>
+          </a:xfrm>
+          <a:prstGeom prst="rect">
+            <a:avLst/>
+          </a:prstGeom>
+          <a:noFill/>
+        </p:spPr>
+        <p:txBody>
+          <a:bodyPr wrap="square" rtlCol="0">
+            <a:spAutoFit/>
+          </a:bodyPr>
+          <a:lstStyle/>
+          <a:p>
+            <a:r>
+              <a:rPr lang="en-US" sz="1200" dirty="0">
+                <a:solidFill>
+                  <a:srgbClr val="FF0000"/>
+                </a:solidFill>
+              </a:rPr>
+              <a:t>Activations in red</a:t>
+            </a:r>
+          </a:p>
+        </p:txBody>
+      </p:sp>
     </p:spTree>
     <p:extLst>
       <p:ext uri="{BB962C8B-B14F-4D97-AF65-F5344CB8AC3E}">
@@ -28874,6 +29140,45 @@
             <a:r>
               <a:rPr lang="en-US" dirty="0"/>
               <a:t>Okay, what’s the local gradient?</a:t>
+            </a:r>
+          </a:p>
+        </p:txBody>
+      </p:sp>
+      <p:sp>
+        <p:nvSpPr>
+          <p:cNvPr id="5" name="TextBox 4">
+            <a:extLst>
+              <a:ext uri="{FF2B5EF4-FFF2-40B4-BE49-F238E27FC236}">
+                <a16:creationId xmlns:a16="http://schemas.microsoft.com/office/drawing/2014/main" id="{94CCC78F-FEE3-4723-9298-C327904FB476}"/>
+              </a:ext>
+            </a:extLst>
+          </p:cNvPr>
+          <p:cNvSpPr txBox="1"/>
+          <p:nvPr/>
+        </p:nvSpPr>
+        <p:spPr>
+          <a:xfrm>
+            <a:off x="1109472" y="2353056"/>
+            <a:ext cx="1109472" cy="461665"/>
+          </a:xfrm>
+          <a:prstGeom prst="rect">
+            <a:avLst/>
+          </a:prstGeom>
+          <a:noFill/>
+        </p:spPr>
+        <p:txBody>
+          <a:bodyPr wrap="square" rtlCol="0">
+            <a:spAutoFit/>
+          </a:bodyPr>
+          <a:lstStyle/>
+          <a:p>
+            <a:r>
+              <a:rPr lang="en-US" sz="1200" dirty="0">
+                <a:solidFill>
+                  <a:srgbClr val="FF0000"/>
+                </a:solidFill>
+              </a:rPr>
+              <a:t>Activations in red</a:t>
             </a:r>
           </a:p>
         </p:txBody>
@@ -29480,6 +29785,45 @@
           </a:p>
         </p:txBody>
       </p:sp>
+      <p:sp>
+        <p:nvSpPr>
+          <p:cNvPr id="5" name="TextBox 4">
+            <a:extLst>
+              <a:ext uri="{FF2B5EF4-FFF2-40B4-BE49-F238E27FC236}">
+                <a16:creationId xmlns:a16="http://schemas.microsoft.com/office/drawing/2014/main" id="{AC720838-F074-4042-BC53-207258A83103}"/>
+              </a:ext>
+            </a:extLst>
+          </p:cNvPr>
+          <p:cNvSpPr txBox="1"/>
+          <p:nvPr/>
+        </p:nvSpPr>
+        <p:spPr>
+          <a:xfrm>
+            <a:off x="1109472" y="2353056"/>
+            <a:ext cx="1109472" cy="461665"/>
+          </a:xfrm>
+          <a:prstGeom prst="rect">
+            <a:avLst/>
+          </a:prstGeom>
+          <a:noFill/>
+        </p:spPr>
+        <p:txBody>
+          <a:bodyPr wrap="square" rtlCol="0">
+            <a:spAutoFit/>
+          </a:bodyPr>
+          <a:lstStyle/>
+          <a:p>
+            <a:r>
+              <a:rPr lang="en-US" sz="1200" dirty="0">
+                <a:solidFill>
+                  <a:srgbClr val="FF0000"/>
+                </a:solidFill>
+              </a:rPr>
+              <a:t>Activations in red</a:t>
+            </a:r>
+          </a:p>
+        </p:txBody>
+      </p:sp>
     </p:spTree>
     <p:extLst>
       <p:ext uri="{BB962C8B-B14F-4D97-AF65-F5344CB8AC3E}">
@@ -29577,10 +29921,10 @@
       </p:pic>
       <p:sp>
         <p:nvSpPr>
-          <p:cNvPr id="6" name="TextBox 5">
+          <p:cNvPr id="5" name="TextBox 4">
             <a:extLst>
               <a:ext uri="{FF2B5EF4-FFF2-40B4-BE49-F238E27FC236}">
-                <a16:creationId xmlns:a16="http://schemas.microsoft.com/office/drawing/2014/main" id="{80632590-0C3E-482D-BD43-2F36F7844CCA}"/>
+                <a16:creationId xmlns:a16="http://schemas.microsoft.com/office/drawing/2014/main" id="{9BBAFA7B-DE22-4EA9-B47C-C50F2EE0C60A}"/>
               </a:ext>
             </a:extLst>
           </p:cNvPr>
@@ -29589,8 +29933,47 @@
         </p:nvSpPr>
         <p:spPr>
           <a:xfrm>
-            <a:off x="1371190" y="5216045"/>
-            <a:ext cx="9117516" cy="369332"/>
+            <a:off x="1109472" y="2353056"/>
+            <a:ext cx="1109472" cy="461665"/>
+          </a:xfrm>
+          <a:prstGeom prst="rect">
+            <a:avLst/>
+          </a:prstGeom>
+          <a:noFill/>
+        </p:spPr>
+        <p:txBody>
+          <a:bodyPr wrap="square" rtlCol="0">
+            <a:spAutoFit/>
+          </a:bodyPr>
+          <a:lstStyle/>
+          <a:p>
+            <a:r>
+              <a:rPr lang="en-US" sz="1200" dirty="0">
+                <a:solidFill>
+                  <a:srgbClr val="FF0000"/>
+                </a:solidFill>
+              </a:rPr>
+              <a:t>Activations in red</a:t>
+            </a:r>
+          </a:p>
+        </p:txBody>
+      </p:sp>
+      <p:sp>
+        <p:nvSpPr>
+          <p:cNvPr id="7" name="TextBox 6">
+            <a:extLst>
+              <a:ext uri="{FF2B5EF4-FFF2-40B4-BE49-F238E27FC236}">
+                <a16:creationId xmlns:a16="http://schemas.microsoft.com/office/drawing/2014/main" id="{5A4C2BE3-010F-4ACB-997A-03DD178A3F9C}"/>
+              </a:ext>
+            </a:extLst>
+          </p:cNvPr>
+          <p:cNvSpPr txBox="1"/>
+          <p:nvPr/>
+        </p:nvSpPr>
+        <p:spPr>
+          <a:xfrm>
+            <a:off x="4194048" y="5216045"/>
+            <a:ext cx="1633728" cy="646331"/>
           </a:xfrm>
           <a:prstGeom prst="rect">
             <a:avLst/>
@@ -29605,7 +29988,13 @@
           <a:p>
             <a:r>
               <a:rPr lang="en-US" dirty="0"/>
-              <a:t>We’re going to speed through the rest.</a:t>
+              <a:t>f(x, c) = x + c</a:t>
+            </a:r>
+          </a:p>
+          <a:p>
+            <a:r>
+              <a:rPr lang="en-US" dirty="0"/>
+              <a:t>f(a1,B) = a1 + B </a:t>
             </a:r>
           </a:p>
         </p:txBody>
@@ -29705,6 +30094,94 @@
           </a:prstGeom>
         </p:spPr>
       </p:pic>
+      <p:sp>
+        <p:nvSpPr>
+          <p:cNvPr id="3" name="TextBox 2">
+            <a:extLst>
+              <a:ext uri="{FF2B5EF4-FFF2-40B4-BE49-F238E27FC236}">
+                <a16:creationId xmlns:a16="http://schemas.microsoft.com/office/drawing/2014/main" id="{99B4FCD9-C098-4BF8-AB12-1D675A0CC358}"/>
+              </a:ext>
+            </a:extLst>
+          </p:cNvPr>
+          <p:cNvSpPr txBox="1"/>
+          <p:nvPr/>
+        </p:nvSpPr>
+        <p:spPr>
+          <a:xfrm>
+            <a:off x="1109472" y="2353056"/>
+            <a:ext cx="1109472" cy="461665"/>
+          </a:xfrm>
+          <a:prstGeom prst="rect">
+            <a:avLst/>
+          </a:prstGeom>
+          <a:noFill/>
+        </p:spPr>
+        <p:txBody>
+          <a:bodyPr wrap="square" rtlCol="0">
+            <a:spAutoFit/>
+          </a:bodyPr>
+          <a:lstStyle/>
+          <a:p>
+            <a:r>
+              <a:rPr lang="en-US" sz="1200" dirty="0">
+                <a:solidFill>
+                  <a:srgbClr val="FF0000"/>
+                </a:solidFill>
+              </a:rPr>
+              <a:t>Activations in red</a:t>
+            </a:r>
+          </a:p>
+        </p:txBody>
+      </p:sp>
+      <p:sp>
+        <p:nvSpPr>
+          <p:cNvPr id="5" name="TextBox 4">
+            <a:extLst>
+              <a:ext uri="{FF2B5EF4-FFF2-40B4-BE49-F238E27FC236}">
+                <a16:creationId xmlns:a16="http://schemas.microsoft.com/office/drawing/2014/main" id="{820E91B5-3777-44BE-9114-4A6F6E90C513}"/>
+              </a:ext>
+            </a:extLst>
+          </p:cNvPr>
+          <p:cNvSpPr txBox="1"/>
+          <p:nvPr/>
+        </p:nvSpPr>
+        <p:spPr>
+          <a:xfrm>
+            <a:off x="2523744" y="5061861"/>
+            <a:ext cx="1950720" cy="646331"/>
+          </a:xfrm>
+          <a:prstGeom prst="rect">
+            <a:avLst/>
+          </a:prstGeom>
+          <a:noFill/>
+        </p:spPr>
+        <p:txBody>
+          <a:bodyPr wrap="square" rtlCol="0">
+            <a:spAutoFit/>
+          </a:bodyPr>
+          <a:lstStyle/>
+          <a:p>
+            <a:r>
+              <a:rPr lang="en-US" dirty="0"/>
+              <a:t>g(</a:t>
+            </a:r>
+            <a:r>
+              <a:rPr lang="en-US" dirty="0" err="1"/>
+              <a:t>x,d</a:t>
+            </a:r>
+            <a:r>
+              <a:rPr lang="en-US" dirty="0"/>
+              <a:t>) = x * d </a:t>
+            </a:r>
+          </a:p>
+          <a:p>
+            <a:r>
+              <a:rPr lang="en-US" dirty="0"/>
+              <a:t> g(a0,W) = a0 * W</a:t>
+            </a:r>
+          </a:p>
+        </p:txBody>
+      </p:sp>
     </p:spTree>
     <p:extLst>
       <p:ext uri="{BB962C8B-B14F-4D97-AF65-F5344CB8AC3E}">
@@ -30401,6 +30878,361 @@
           <p:cNvPr id="2" name="Title 1">
             <a:extLst>
               <a:ext uri="{FF2B5EF4-FFF2-40B4-BE49-F238E27FC236}">
+                <a16:creationId xmlns:a16="http://schemas.microsoft.com/office/drawing/2014/main" id="{9B7EA63C-3E99-42B8-BFD8-9F898B7A401D}"/>
+              </a:ext>
+            </a:extLst>
+          </p:cNvPr>
+          <p:cNvSpPr>
+            <a:spLocks noGrp="1"/>
+          </p:cNvSpPr>
+          <p:nvPr>
+            <p:ph type="title"/>
+          </p:nvPr>
+        </p:nvSpPr>
+        <p:spPr/>
+        <p:txBody>
+          <a:bodyPr/>
+          <a:lstStyle/>
+          <a:p>
+            <a:r>
+              <a:rPr lang="en-US" dirty="0"/>
+              <a:t>Big takeaway</a:t>
+            </a:r>
+          </a:p>
+        </p:txBody>
+      </p:sp>
+      <mc:AlternateContent xmlns:mc="http://schemas.openxmlformats.org/markup-compatibility/2006">
+        <mc:Choice xmlns:a14="http://schemas.microsoft.com/office/drawing/2010/main" Requires="a14">
+          <p:sp>
+            <p:nvSpPr>
+              <p:cNvPr id="3" name="Content Placeholder 2">
+                <a:extLst>
+                  <a:ext uri="{FF2B5EF4-FFF2-40B4-BE49-F238E27FC236}">
+                    <a16:creationId xmlns:a16="http://schemas.microsoft.com/office/drawing/2014/main" id="{9806BFDB-3FB0-44AB-ACA4-8F42DB21472E}"/>
+                  </a:ext>
+                </a:extLst>
+              </p:cNvPr>
+              <p:cNvSpPr>
+                <a:spLocks noGrp="1"/>
+              </p:cNvSpPr>
+              <p:nvPr>
+                <p:ph idx="1"/>
+              </p:nvPr>
+            </p:nvSpPr>
+            <p:spPr/>
+            <p:txBody>
+              <a:bodyPr/>
+              <a:lstStyle/>
+              <a:p>
+                <a:pPr marL="0" indent="0">
+                  <a:buNone/>
+                </a:pPr>
+                <a:r>
+                  <a:rPr lang="en-US" dirty="0"/>
+                  <a:t>Neural Networks are nothing more than a series of differentiable composite functions.</a:t>
+                </a:r>
+              </a:p>
+              <a:p>
+                <a:pPr marL="0" indent="0">
+                  <a:buNone/>
+                </a:pPr>
+                <a:endParaRPr lang="en-US" dirty="0"/>
+              </a:p>
+              <a:p>
+                <a:pPr marL="0" indent="0">
+                  <a:buNone/>
+                </a:pPr>
+                <a:r>
+                  <a:rPr lang="en-US" dirty="0"/>
+                  <a:t>This last one is:</a:t>
+                </a:r>
+              </a:p>
+              <a:p>
+                <a:pPr marL="0" indent="0">
+                  <a:buNone/>
+                </a:pPr>
+                <a14:m>
+                  <m:oMathPara xmlns:m="http://schemas.openxmlformats.org/officeDocument/2006/math">
+                    <m:oMathParaPr>
+                      <m:jc m:val="centerGroup"/>
+                    </m:oMathParaPr>
+                    <m:oMath xmlns:m="http://schemas.openxmlformats.org/officeDocument/2006/math">
+                      <m:acc>
+                        <m:accPr>
+                          <m:chr m:val="̂"/>
+                          <m:ctrlPr>
+                            <a:rPr lang="en-US" i="1">
+                              <a:latin typeface="Cambria Math" panose="02040503050406030204" pitchFamily="18" charset="0"/>
+                            </a:rPr>
+                          </m:ctrlPr>
+                        </m:accPr>
+                        <m:e>
+                          <m:r>
+                            <a:rPr lang="en-US" i="1">
+                              <a:latin typeface="Cambria Math" panose="02040503050406030204" pitchFamily="18" charset="0"/>
+                            </a:rPr>
+                            <m:t>𝑌</m:t>
+                          </m:r>
+                        </m:e>
+                      </m:acc>
+                      <m:r>
+                        <a:rPr lang="en-US" i="1">
+                          <a:latin typeface="Cambria Math" panose="02040503050406030204" pitchFamily="18" charset="0"/>
+                        </a:rPr>
+                        <m:t>=</m:t>
+                      </m:r>
+                      <m:r>
+                        <a:rPr lang="en-US" b="0" i="1" smtClean="0">
+                          <a:latin typeface="Cambria Math" panose="02040503050406030204" pitchFamily="18" charset="0"/>
+                        </a:rPr>
+                        <m:t>𝑓</m:t>
+                      </m:r>
+                      <m:r>
+                        <a:rPr lang="en-US" b="0" i="1" smtClean="0">
+                          <a:latin typeface="Cambria Math" panose="02040503050406030204" pitchFamily="18" charset="0"/>
+                        </a:rPr>
+                        <m:t>(</m:t>
+                      </m:r>
+                      <m:r>
+                        <a:rPr lang="en-US" b="0" i="1" smtClean="0">
+                          <a:latin typeface="Cambria Math" panose="02040503050406030204" pitchFamily="18" charset="0"/>
+                        </a:rPr>
+                        <m:t>𝑔</m:t>
+                      </m:r>
+                      <m:r>
+                        <a:rPr lang="en-US" b="0" i="1" smtClean="0">
+                          <a:latin typeface="Cambria Math" panose="02040503050406030204" pitchFamily="18" charset="0"/>
+                        </a:rPr>
+                        <m:t>(</m:t>
+                      </m:r>
+                      <m:func>
+                        <m:funcPr>
+                          <m:ctrlPr>
+                            <a:rPr lang="en-US" b="0" i="1" smtClean="0">
+                              <a:latin typeface="Cambria Math" panose="02040503050406030204" pitchFamily="18" charset="0"/>
+                            </a:rPr>
+                          </m:ctrlPr>
+                        </m:funcPr>
+                        <m:fName>
+                          <m:r>
+                            <m:rPr>
+                              <m:sty m:val="p"/>
+                            </m:rPr>
+                            <a:rPr lang="en-US" b="0" i="0" smtClean="0">
+                              <a:latin typeface="Cambria Math" panose="02040503050406030204" pitchFamily="18" charset="0"/>
+                            </a:rPr>
+                            <m:t>max</m:t>
+                          </m:r>
+                        </m:fName>
+                        <m:e>
+                          <m:d>
+                            <m:dPr>
+                              <m:ctrlPr>
+                                <a:rPr lang="en-US" b="0" i="1" smtClean="0">
+                                  <a:latin typeface="Cambria Math" panose="02040503050406030204" pitchFamily="18" charset="0"/>
+                                </a:rPr>
+                              </m:ctrlPr>
+                            </m:dPr>
+                            <m:e>
+                              <m:r>
+                                <a:rPr lang="en-US" b="0" i="1" smtClean="0">
+                                  <a:latin typeface="Cambria Math" panose="02040503050406030204" pitchFamily="18" charset="0"/>
+                                </a:rPr>
+                                <m:t>𝑓</m:t>
+                              </m:r>
+                              <m:d>
+                                <m:dPr>
+                                  <m:ctrlPr>
+                                    <a:rPr lang="en-US" b="0" i="1" smtClean="0">
+                                      <a:latin typeface="Cambria Math" panose="02040503050406030204" pitchFamily="18" charset="0"/>
+                                    </a:rPr>
+                                  </m:ctrlPr>
+                                </m:dPr>
+                                <m:e>
+                                  <m:r>
+                                    <a:rPr lang="en-US" b="0" i="1" smtClean="0">
+                                      <a:latin typeface="Cambria Math" panose="02040503050406030204" pitchFamily="18" charset="0"/>
+                                    </a:rPr>
+                                    <m:t>𝑔</m:t>
+                                  </m:r>
+                                  <m:d>
+                                    <m:dPr>
+                                      <m:ctrlPr>
+                                        <a:rPr lang="en-US" b="0" i="1" smtClean="0">
+                                          <a:latin typeface="Cambria Math" panose="02040503050406030204" pitchFamily="18" charset="0"/>
+                                        </a:rPr>
+                                      </m:ctrlPr>
+                                    </m:dPr>
+                                    <m:e>
+                                      <m:r>
+                                        <a:rPr lang="en-US" b="0" i="1" smtClean="0">
+                                          <a:latin typeface="Cambria Math" panose="02040503050406030204" pitchFamily="18" charset="0"/>
+                                        </a:rPr>
+                                        <m:t>𝑋</m:t>
+                                      </m:r>
+                                      <m:r>
+                                        <a:rPr lang="en-US" b="0" i="1" smtClean="0">
+                                          <a:latin typeface="Cambria Math" panose="02040503050406030204" pitchFamily="18" charset="0"/>
+                                        </a:rPr>
+                                        <m:t>,</m:t>
+                                      </m:r>
+                                      <m:r>
+                                        <a:rPr lang="en-US" b="0" i="1" smtClean="0">
+                                          <a:latin typeface="Cambria Math" panose="02040503050406030204" pitchFamily="18" charset="0"/>
+                                        </a:rPr>
+                                        <m:t>𝑊</m:t>
+                                      </m:r>
+                                      <m:r>
+                                        <a:rPr lang="en-US" b="0" i="1" smtClean="0">
+                                          <a:latin typeface="Cambria Math" panose="02040503050406030204" pitchFamily="18" charset="0"/>
+                                        </a:rPr>
+                                        <m:t>1</m:t>
+                                      </m:r>
+                                    </m:e>
+                                  </m:d>
+                                  <m:r>
+                                    <a:rPr lang="en-US" b="0" i="1" smtClean="0">
+                                      <a:latin typeface="Cambria Math" panose="02040503050406030204" pitchFamily="18" charset="0"/>
+                                    </a:rPr>
+                                    <m:t>,</m:t>
+                                  </m:r>
+                                  <m:r>
+                                    <a:rPr lang="en-US" b="0" i="1" smtClean="0">
+                                      <a:latin typeface="Cambria Math" panose="02040503050406030204" pitchFamily="18" charset="0"/>
+                                    </a:rPr>
+                                    <m:t>𝐵</m:t>
+                                  </m:r>
+                                  <m:r>
+                                    <a:rPr lang="en-US" b="0" i="1" smtClean="0">
+                                      <a:latin typeface="Cambria Math" panose="02040503050406030204" pitchFamily="18" charset="0"/>
+                                    </a:rPr>
+                                    <m:t>1</m:t>
+                                  </m:r>
+                                </m:e>
+                              </m:d>
+                              <m:r>
+                                <a:rPr lang="en-US" b="0" i="1" smtClean="0">
+                                  <a:latin typeface="Cambria Math" panose="02040503050406030204" pitchFamily="18" charset="0"/>
+                                </a:rPr>
+                                <m:t>,0</m:t>
+                              </m:r>
+                            </m:e>
+                          </m:d>
+                        </m:e>
+                      </m:func>
+                      <m:r>
+                        <a:rPr lang="en-US" b="0" i="1" smtClean="0">
+                          <a:latin typeface="Cambria Math" panose="02040503050406030204" pitchFamily="18" charset="0"/>
+                        </a:rPr>
+                        <m:t>,</m:t>
+                      </m:r>
+                      <m:r>
+                        <a:rPr lang="en-US" b="0" i="1" smtClean="0">
+                          <a:latin typeface="Cambria Math" panose="02040503050406030204" pitchFamily="18" charset="0"/>
+                        </a:rPr>
+                        <m:t>𝑊</m:t>
+                      </m:r>
+                      <m:r>
+                        <a:rPr lang="en-US" b="0" i="1" smtClean="0">
+                          <a:latin typeface="Cambria Math" panose="02040503050406030204" pitchFamily="18" charset="0"/>
+                        </a:rPr>
+                        <m:t>2),</m:t>
+                      </m:r>
+                      <m:r>
+                        <a:rPr lang="en-US" b="0" i="1" smtClean="0">
+                          <a:latin typeface="Cambria Math" panose="02040503050406030204" pitchFamily="18" charset="0"/>
+                        </a:rPr>
+                        <m:t>𝐵</m:t>
+                      </m:r>
+                      <m:r>
+                        <a:rPr lang="en-US" b="0" i="1" smtClean="0">
+                          <a:latin typeface="Cambria Math" panose="02040503050406030204" pitchFamily="18" charset="0"/>
+                        </a:rPr>
+                        <m:t>2)</m:t>
+                      </m:r>
+                    </m:oMath>
+                  </m:oMathPara>
+                </a14:m>
+                <a:endParaRPr lang="en-US" dirty="0"/>
+              </a:p>
+            </p:txBody>
+          </p:sp>
+        </mc:Choice>
+        <mc:Fallback>
+          <p:sp>
+            <p:nvSpPr>
+              <p:cNvPr id="3" name="Content Placeholder 2">
+                <a:extLst>
+                  <a:ext uri="{FF2B5EF4-FFF2-40B4-BE49-F238E27FC236}">
+                    <a16:creationId xmlns:a16="http://schemas.microsoft.com/office/drawing/2014/main" id="{9806BFDB-3FB0-44AB-ACA4-8F42DB21472E}"/>
+                  </a:ext>
+                </a:extLst>
+              </p:cNvPr>
+              <p:cNvSpPr>
+                <a:spLocks noGrp="1" noRot="1" noChangeAspect="1" noMove="1" noResize="1" noEditPoints="1" noAdjustHandles="1" noChangeArrowheads="1" noChangeShapeType="1" noTextEdit="1"/>
+              </p:cNvSpPr>
+              <p:nvPr>
+                <p:ph idx="1"/>
+              </p:nvPr>
+            </p:nvSpPr>
+            <p:spPr>
+              <a:blipFill>
+                <a:blip r:embed="rId2"/>
+                <a:stretch>
+                  <a:fillRect l="-1217" t="-2241"/>
+                </a:stretch>
+              </a:blipFill>
+            </p:spPr>
+            <p:txBody>
+              <a:bodyPr/>
+              <a:lstStyle/>
+              <a:p>
+                <a:r>
+                  <a:rPr lang="en-US">
+                    <a:noFill/>
+                  </a:rPr>
+                  <a:t> </a:t>
+                </a:r>
+              </a:p>
+            </p:txBody>
+          </p:sp>
+        </mc:Fallback>
+      </mc:AlternateContent>
+    </p:spTree>
+    <p:extLst>
+      <p:ext uri="{BB962C8B-B14F-4D97-AF65-F5344CB8AC3E}">
+        <p14:creationId xmlns:p14="http://schemas.microsoft.com/office/powerpoint/2010/main" val="3074158390"/>
+      </p:ext>
+    </p:extLst>
+  </p:cSld>
+  <p:clrMapOvr>
+    <a:masterClrMapping/>
+  </p:clrMapOvr>
+</p:sld>
+</file>
+
+<file path=ppt/slides/slide74.xml><?xml version="1.0" encoding="utf-8"?>
+<p:sld xmlns:a="http://schemas.openxmlformats.org/drawingml/2006/main" xmlns:r="http://schemas.openxmlformats.org/officeDocument/2006/relationships" xmlns:p="http://schemas.openxmlformats.org/presentationml/2006/main">
+  <p:cSld>
+    <p:spTree>
+      <p:nvGrpSpPr>
+        <p:cNvPr id="1" name=""/>
+        <p:cNvGrpSpPr/>
+        <p:nvPr/>
+      </p:nvGrpSpPr>
+      <p:grpSpPr>
+        <a:xfrm>
+          <a:off x="0" y="0"/>
+          <a:ext cx="0" cy="0"/>
+          <a:chOff x="0" y="0"/>
+          <a:chExt cx="0" cy="0"/>
+        </a:xfrm>
+      </p:grpSpPr>
+      <p:sp>
+        <p:nvSpPr>
+          <p:cNvPr id="2" name="Title 1">
+            <a:extLst>
+              <a:ext uri="{FF2B5EF4-FFF2-40B4-BE49-F238E27FC236}">
                 <a16:creationId xmlns:a16="http://schemas.microsoft.com/office/drawing/2014/main" id="{9E788952-3D1D-4A0A-8C19-EE74F203A537}"/>
               </a:ext>
             </a:extLst>
@@ -30553,7 +31385,7 @@
 </p:sld>
 </file>
 
-<file path=ppt/slides/slide74.xml><?xml version="1.0" encoding="utf-8"?>
+<file path=ppt/slides/slide75.xml><?xml version="1.0" encoding="utf-8"?>
 <p:sld xmlns:a="http://schemas.openxmlformats.org/drawingml/2006/main" xmlns:r="http://schemas.openxmlformats.org/officeDocument/2006/relationships" xmlns:p="http://schemas.openxmlformats.org/presentationml/2006/main">
   <p:cSld>
     <p:spTree>
@@ -30725,8 +31557,8 @@
           </a:p>
         </p:txBody>
       </p:sp>
-      <mc:AlternateContent xmlns:mc="http://schemas.openxmlformats.org/markup-compatibility/2006">
-        <mc:Choice xmlns:a14="http://schemas.microsoft.com/office/drawing/2010/main" Requires="a14">
+      <mc:AlternateContent xmlns:mc="http://schemas.openxmlformats.org/markup-compatibility/2006" xmlns:a14="http://schemas.microsoft.com/office/drawing/2010/main">
+        <mc:Choice Requires="a14">
           <p:sp>
             <p:nvSpPr>
               <p:cNvPr id="7" name="TextBox 6">
@@ -30824,7 +31656,7 @@
             </p:txBody>
           </p:sp>
         </mc:Choice>
-        <mc:Fallback>
+        <mc:Fallback xmlns="">
           <p:sp>
             <p:nvSpPr>
               <p:cNvPr id="7" name="TextBox 6">
@@ -30899,7 +31731,7 @@
           <a:p>
             <a:r>
               <a:rPr lang="en-US" sz="2400" dirty="0"/>
-              <a:t>What is the loss function?</a:t>
+              <a:t>What is the loss function (for one observation)?</a:t>
             </a:r>
           </a:p>
         </p:txBody>
@@ -30971,8 +31803,8 @@
           </a:p>
         </p:txBody>
       </p:sp>
-      <mc:AlternateContent xmlns:mc="http://schemas.openxmlformats.org/markup-compatibility/2006">
-        <mc:Choice xmlns:a14="http://schemas.microsoft.com/office/drawing/2010/main" Requires="a14">
+      <mc:AlternateContent xmlns:mc="http://schemas.openxmlformats.org/markup-compatibility/2006" xmlns:a14="http://schemas.microsoft.com/office/drawing/2010/main">
+        <mc:Choice Requires="a14">
           <p:sp>
             <p:nvSpPr>
               <p:cNvPr id="7" name="TextBox 6">
@@ -31070,7 +31902,7 @@
             </p:txBody>
           </p:sp>
         </mc:Choice>
-        <mc:Fallback>
+        <mc:Fallback xmlns="">
           <p:sp>
             <p:nvSpPr>
               <p:cNvPr id="7" name="TextBox 6">
@@ -31145,13 +31977,13 @@
           <a:p>
             <a:r>
               <a:rPr lang="en-US" sz="2400" dirty="0"/>
-              <a:t>What is the loss function?</a:t>
+              <a:t>What is the loss function (for one observation)?</a:t>
             </a:r>
           </a:p>
         </p:txBody>
       </p:sp>
-      <mc:AlternateContent xmlns:mc="http://schemas.openxmlformats.org/markup-compatibility/2006">
-        <mc:Choice xmlns:a14="http://schemas.microsoft.com/office/drawing/2010/main" Requires="a14">
+      <mc:AlternateContent xmlns:mc="http://schemas.openxmlformats.org/markup-compatibility/2006" xmlns:a14="http://schemas.microsoft.com/office/drawing/2010/main">
+        <mc:Choice Requires="a14">
           <p:sp>
             <p:nvSpPr>
               <p:cNvPr id="9" name="TextBox 8">
@@ -31389,7 +32221,7 @@
             </p:txBody>
           </p:sp>
         </mc:Choice>
-        <mc:Fallback>
+        <mc:Fallback xmlns="">
           <p:sp>
             <p:nvSpPr>
               <p:cNvPr id="9" name="TextBox 8">
@@ -31451,7 +32283,7 @@
             <p:spPr>
               <a:xfrm>
                 <a:off x="1030513" y="4291876"/>
-                <a:ext cx="10130971" cy="1846659"/>
+                <a:ext cx="10130971" cy="1569660"/>
               </a:xfrm>
               <a:prstGeom prst="rect">
                 <a:avLst/>
@@ -31521,12 +32353,6 @@
               <a:p>
                 <a:endParaRPr lang="en-US" sz="2400" dirty="0"/>
               </a:p>
-              <a:p>
-                <a:r>
-                  <a:rPr lang="en-US" dirty="0"/>
-                  <a:t>(switch to r)</a:t>
-                </a:r>
-              </a:p>
             </p:txBody>
           </p:sp>
         </mc:Choice>
@@ -31548,7 +32374,7 @@
             <p:spPr>
               <a:xfrm>
                 <a:off x="1030513" y="4291876"/>
-                <a:ext cx="10130971" cy="1846659"/>
+                <a:ext cx="10130971" cy="1569660"/>
               </a:xfrm>
               <a:prstGeom prst="rect">
                 <a:avLst/>
@@ -31556,7 +32382,7 @@
               <a:blipFill>
                 <a:blip r:embed="rId5"/>
                 <a:stretch>
-                  <a:fillRect l="-903" t="-2640" b="-4290"/>
+                  <a:fillRect l="-903" t="-3101"/>
                 </a:stretch>
               </a:blipFill>
             </p:spPr>

</xml_diff>

<commit_message>
Final fiddling with the ppt.
</commit_message>
<xml_diff>
--- a/secondPart/Neural Networks - pt 2.pptx
+++ b/secondPart/Neural Networks - pt 2.pptx
@@ -13833,8 +13833,8 @@
           <a:chExt cx="0" cy="0"/>
         </a:xfrm>
       </p:grpSpPr>
-      <mc:AlternateContent xmlns:mc="http://schemas.openxmlformats.org/markup-compatibility/2006" xmlns:a14="http://schemas.microsoft.com/office/drawing/2010/main">
-        <mc:Choice Requires="a14">
+      <mc:AlternateContent xmlns:mc="http://schemas.openxmlformats.org/markup-compatibility/2006">
+        <mc:Choice xmlns:a14="http://schemas.microsoft.com/office/drawing/2010/main" Requires="a14">
           <p:sp>
             <p:nvSpPr>
               <p:cNvPr id="3" name="Content Placeholder 2"/>
@@ -13853,7 +13853,7 @@
             </p:spPr>
             <p:txBody>
               <a:bodyPr>
-                <a:normAutofit/>
+                <a:normAutofit lnSpcReduction="10000"/>
               </a:bodyPr>
               <a:lstStyle/>
               <a:p>
@@ -13998,11 +13998,49 @@
                         </m:r>
                       </m:e>
                     </m:acc>
+                    <m:r>
+                      <a:rPr lang="en-US" b="0" i="0" smtClean="0">
+                        <a:latin typeface="Cambria Math" panose="02040503050406030204" pitchFamily="18" charset="0"/>
+                      </a:rPr>
+                      <m:t>:</m:t>
+                    </m:r>
                   </m:oMath>
                 </a14:m>
-                <a:r>
-                  <a:rPr lang="en-US" dirty="0"/>
-                  <a:t>.</a:t>
+                <a:endParaRPr lang="en-US" b="0" dirty="0"/>
+              </a:p>
+              <a:p>
+                <a:pPr marL="0" indent="0" algn="ctr">
+                  <a:buNone/>
+                </a:pPr>
+                <a:r>
+                  <a:rPr lang="en-US" dirty="0"/>
+                  <a:t>L(Y, </a:t>
+                </a:r>
+                <a14:m>
+                  <m:oMath xmlns:m="http://schemas.openxmlformats.org/officeDocument/2006/math">
+                    <m:acc>
+                      <m:accPr>
+                        <m:chr m:val="̂"/>
+                        <m:ctrlPr>
+                          <a:rPr lang="en-US" i="1">
+                            <a:latin typeface="Cambria Math" panose="02040503050406030204" pitchFamily="18" charset="0"/>
+                          </a:rPr>
+                        </m:ctrlPr>
+                      </m:accPr>
+                      <m:e>
+                        <m:r>
+                          <a:rPr lang="en-US" i="1">
+                            <a:latin typeface="Cambria Math" panose="02040503050406030204" pitchFamily="18" charset="0"/>
+                          </a:rPr>
+                          <m:t>𝑌</m:t>
+                        </m:r>
+                      </m:e>
+                    </m:acc>
+                  </m:oMath>
+                </a14:m>
+                <a:r>
+                  <a:rPr lang="en-US" dirty="0"/>
+                  <a:t>)</a:t>
                 </a:r>
               </a:p>
               <a:p>
@@ -14068,7 +14106,33 @@
                 </a14:m>
                 <a:r>
                   <a:rPr lang="en-US" dirty="0"/>
-                  <a:t> = a1 + B</a:t>
+                  <a:t> = f(a1, B) </a:t>
+                </a:r>
+              </a:p>
+              <a:p>
+                <a:pPr marL="0" indent="0">
+                  <a:buNone/>
+                </a:pPr>
+                <a:r>
+                  <a:rPr lang="en-US" dirty="0"/>
+                  <a:t>Or combined…</a:t>
+                </a:r>
+              </a:p>
+              <a:p>
+                <a:pPr marL="0" indent="0" algn="ctr">
+                  <a:buNone/>
+                </a:pPr>
+                <a:r>
+                  <a:rPr lang="en-US" dirty="0"/>
+                  <a:t>L(</a:t>
+                </a:r>
+                <a:r>
+                  <a:rPr lang="en-US" dirty="0" err="1"/>
+                  <a:t>Y,f</a:t>
+                </a:r>
+                <a:r>
+                  <a:rPr lang="en-US" dirty="0"/>
+                  <a:t>(a1, B)) </a:t>
                 </a:r>
               </a:p>
               <a:p>
@@ -14436,7 +14500,7 @@
             </p:txBody>
           </p:sp>
         </mc:Choice>
-        <mc:Fallback xmlns="">
+        <mc:Fallback>
           <p:sp>
             <p:nvSpPr>
               <p:cNvPr id="3" name="Content Placeholder 2"/>
@@ -14455,7 +14519,7 @@
               <a:blipFill>
                 <a:blip r:embed="rId2"/>
                 <a:stretch>
-                  <a:fillRect l="-1217"/>
+                  <a:fillRect l="-1217" t="-762"/>
                 </a:stretch>
               </a:blipFill>
             </p:spPr>

</xml_diff>